<commit_message>
documentos atualizados para a 3ª entrega
</commit_message>
<xml_diff>
--- a/3ª entrega(documentos atualizados)/PBL.pptx
+++ b/3ª entrega(documentos atualizados)/PBL.pptx
@@ -325,7 +325,7 @@
           <a:p>
             <a:fld id="{4AAD347D-5ACD-4C99-B74B-A9C85AD731AF}" type="datetimeFigureOut">
               <a:rPr lang="en-US" dirty="0"/>
-              <a:t>4/18/20</a:t>
+              <a:t>4/19/20</a:t>
             </a:fld>
             <a:endParaRPr lang="en-US" dirty="0"/>
           </a:p>
@@ -595,7 +595,7 @@
           <a:p>
             <a:fld id="{4509A250-FF31-4206-8172-F9D3106AACB1}" type="datetimeFigureOut">
               <a:rPr lang="en-US" dirty="0"/>
-              <a:t>4/18/20</a:t>
+              <a:t>4/19/20</a:t>
             </a:fld>
             <a:endParaRPr lang="en-US" dirty="0"/>
           </a:p>
@@ -784,7 +784,7 @@
           <a:p>
             <a:fld id="{4509A250-FF31-4206-8172-F9D3106AACB1}" type="datetimeFigureOut">
               <a:rPr lang="en-US" dirty="0"/>
-              <a:t>4/18/20</a:t>
+              <a:t>4/19/20</a:t>
             </a:fld>
             <a:endParaRPr lang="en-US" dirty="0"/>
           </a:p>
@@ -1052,7 +1052,7 @@
           <a:p>
             <a:fld id="{4509A250-FF31-4206-8172-F9D3106AACB1}" type="datetimeFigureOut">
               <a:rPr lang="en-US" dirty="0"/>
-              <a:t>4/18/20</a:t>
+              <a:t>4/19/20</a:t>
             </a:fld>
             <a:endParaRPr lang="en-US" dirty="0"/>
           </a:p>
@@ -1388,7 +1388,7 @@
           <a:p>
             <a:fld id="{4509A250-FF31-4206-8172-F9D3106AACB1}" type="datetimeFigureOut">
               <a:rPr lang="en-US" dirty="0"/>
-              <a:t>4/18/20</a:t>
+              <a:t>4/19/20</a:t>
             </a:fld>
             <a:endParaRPr lang="en-US" dirty="0"/>
           </a:p>
@@ -2006,7 +2006,7 @@
           <a:p>
             <a:fld id="{4509A250-FF31-4206-8172-F9D3106AACB1}" type="datetimeFigureOut">
               <a:rPr lang="en-US" dirty="0"/>
-              <a:t>4/18/20</a:t>
+              <a:t>4/19/20</a:t>
             </a:fld>
             <a:endParaRPr lang="en-US" dirty="0"/>
           </a:p>
@@ -2861,7 +2861,7 @@
           <a:p>
             <a:fld id="{4509A250-FF31-4206-8172-F9D3106AACB1}" type="datetimeFigureOut">
               <a:rPr lang="en-US" dirty="0"/>
-              <a:t>4/18/20</a:t>
+              <a:t>4/19/20</a:t>
             </a:fld>
             <a:endParaRPr lang="en-US" dirty="0"/>
           </a:p>
@@ -3026,7 +3026,7 @@
           <a:p>
             <a:fld id="{4509A250-FF31-4206-8172-F9D3106AACB1}" type="datetimeFigureOut">
               <a:rPr lang="en-US" dirty="0"/>
-              <a:t>4/18/20</a:t>
+              <a:t>4/19/20</a:t>
             </a:fld>
             <a:endParaRPr lang="en-US" dirty="0"/>
           </a:p>
@@ -3201,7 +3201,7 @@
           <a:p>
             <a:fld id="{4509A250-FF31-4206-8172-F9D3106AACB1}" type="datetimeFigureOut">
               <a:rPr lang="en-US" dirty="0"/>
-              <a:t>4/18/20</a:t>
+              <a:t>4/19/20</a:t>
             </a:fld>
             <a:endParaRPr lang="en-US" dirty="0"/>
           </a:p>
@@ -3366,7 +3366,7 @@
           <a:p>
             <a:fld id="{4509A250-FF31-4206-8172-F9D3106AACB1}" type="datetimeFigureOut">
               <a:rPr lang="en-US" dirty="0"/>
-              <a:t>4/18/20</a:t>
+              <a:t>4/19/20</a:t>
             </a:fld>
             <a:endParaRPr lang="en-US" dirty="0"/>
           </a:p>
@@ -3608,7 +3608,7 @@
           <a:p>
             <a:fld id="{9796027F-7875-4030-9381-8BD8C4F21935}" type="datetimeFigureOut">
               <a:rPr lang="en-US" dirty="0"/>
-              <a:t>4/18/20</a:t>
+              <a:t>4/19/20</a:t>
             </a:fld>
             <a:endParaRPr lang="en-US" dirty="0"/>
           </a:p>
@@ -3895,7 +3895,7 @@
           <a:p>
             <a:fld id="{9796027F-7875-4030-9381-8BD8C4F21935}" type="datetimeFigureOut">
               <a:rPr lang="en-US" dirty="0"/>
-              <a:t>4/18/20</a:t>
+              <a:t>4/19/20</a:t>
             </a:fld>
             <a:endParaRPr lang="en-US" dirty="0"/>
           </a:p>
@@ -4334,7 +4334,7 @@
           <a:p>
             <a:fld id="{9796027F-7875-4030-9381-8BD8C4F21935}" type="datetimeFigureOut">
               <a:rPr lang="en-US" dirty="0"/>
-              <a:t>4/18/20</a:t>
+              <a:t>4/19/20</a:t>
             </a:fld>
             <a:endParaRPr lang="en-US" dirty="0"/>
           </a:p>
@@ -4447,7 +4447,7 @@
           <a:p>
             <a:fld id="{4509A250-FF31-4206-8172-F9D3106AACB1}" type="datetimeFigureOut">
               <a:rPr lang="en-US" dirty="0"/>
-              <a:t>4/18/20</a:t>
+              <a:t>4/19/20</a:t>
             </a:fld>
             <a:endParaRPr lang="en-US" dirty="0"/>
           </a:p>
@@ -4537,7 +4537,7 @@
           <a:p>
             <a:fld id="{4509A250-FF31-4206-8172-F9D3106AACB1}" type="datetimeFigureOut">
               <a:rPr lang="en-US" dirty="0"/>
-              <a:t>4/18/20</a:t>
+              <a:t>4/19/20</a:t>
             </a:fld>
             <a:endParaRPr lang="en-US" dirty="0"/>
           </a:p>
@@ -4811,7 +4811,7 @@
           <a:p>
             <a:fld id="{4509A250-FF31-4206-8172-F9D3106AACB1}" type="datetimeFigureOut">
               <a:rPr lang="en-US" dirty="0"/>
-              <a:t>4/18/20</a:t>
+              <a:t>4/19/20</a:t>
             </a:fld>
             <a:endParaRPr lang="en-US" dirty="0"/>
           </a:p>
@@ -5081,7 +5081,7 @@
           <a:p>
             <a:fld id="{4509A250-FF31-4206-8172-F9D3106AACB1}" type="datetimeFigureOut">
               <a:rPr lang="en-US" dirty="0"/>
-              <a:t>4/18/20</a:t>
+              <a:t>4/19/20</a:t>
             </a:fld>
             <a:endParaRPr lang="en-US" dirty="0"/>
           </a:p>
@@ -5505,7 +5505,7 @@
           <a:p>
             <a:fld id="{4AAD347D-5ACD-4C99-B74B-A9C85AD731AF}" type="datetimeFigureOut">
               <a:rPr lang="en-US" dirty="0"/>
-              <a:t>4/18/20</a:t>
+              <a:t>4/19/20</a:t>
             </a:fld>
             <a:endParaRPr lang="en-US" dirty="0"/>
           </a:p>
@@ -9769,10 +9769,10 @@
       </p:pic>
       <p:pic>
         <p:nvPicPr>
-          <p:cNvPr id="7" name="Marcador de Posição de Conteúdo 6" descr="Uma imagem com captura de ecrã&#10;&#10;Descrição gerada automaticamente">
+          <p:cNvPr id="6" name="Marcador de Posição de Conteúdo 5" descr="Uma imagem com captura de ecrã&#10;&#10;Descrição gerada automaticamente">
             <a:extLst>
               <a:ext uri="{FF2B5EF4-FFF2-40B4-BE49-F238E27FC236}">
-                <a16:creationId xmlns:a16="http://schemas.microsoft.com/office/drawing/2014/main" id="{0710ED67-8171-B04D-BA86-F05033CB85E2}"/>
+                <a16:creationId xmlns:a16="http://schemas.microsoft.com/office/drawing/2014/main" id="{3ABE18B3-3FA5-784C-95F4-F6F8CA8CE2F3}"/>
               </a:ext>
             </a:extLst>
           </p:cNvPr>
@@ -9791,8 +9791,8 @@
         </p:blipFill>
         <p:spPr>
           <a:xfrm>
-            <a:off x="1268607" y="507910"/>
-            <a:ext cx="9105640" cy="3605688"/>
+            <a:off x="1435199" y="375947"/>
+            <a:ext cx="8947150" cy="3744651"/>
           </a:xfrm>
         </p:spPr>
       </p:pic>

</xml_diff>